<commit_message>
adding other package elements that updated after adding eha_classic_xar
</commit_message>
<xml_diff>
--- a/inst/EcoHealthAlliancePPT4x3_classic.pptx
+++ b/inst/EcoHealthAlliancePPT4x3_classic.pptx
@@ -556,7 +556,7 @@
               <a:pPr>
                 <a:defRPr/>
               </a:pPr>
-              <a:t>7/8/21</a:t>
+              <a:t>7/9/21</a:t>
             </a:fld>
             <a:endParaRPr lang="en-US"/>
           </a:p>
@@ -797,7 +797,7 @@
               <a:pPr>
                 <a:defRPr/>
               </a:pPr>
-              <a:t>7/8/21</a:t>
+              <a:t>7/9/21</a:t>
             </a:fld>
             <a:endParaRPr lang="en-US"/>
           </a:p>
@@ -1007,7 +1007,7 @@
               <a:pPr>
                 <a:defRPr/>
               </a:pPr>
-              <a:t>7/8/21</a:t>
+              <a:t>7/9/21</a:t>
             </a:fld>
             <a:endParaRPr lang="en-US"/>
           </a:p>
@@ -1212,7 +1212,7 @@
               <a:pPr>
                 <a:defRPr/>
               </a:pPr>
-              <a:t>7/8/21</a:t>
+              <a:t>7/9/21</a:t>
             </a:fld>
             <a:endParaRPr lang="en-US"/>
           </a:p>
@@ -1486,7 +1486,7 @@
               <a:pPr>
                 <a:defRPr/>
               </a:pPr>
-              <a:t>7/8/21</a:t>
+              <a:t>7/9/21</a:t>
             </a:fld>
             <a:endParaRPr lang="en-US"/>
           </a:p>
@@ -1625,7 +1625,7 @@
         <p:spPr>
           <a:xfrm>
             <a:off x="628650" y="1825625"/>
-            <a:ext cx="3886200" cy="4351338"/>
+            <a:ext cx="3886200" cy="3700532"/>
           </a:xfrm>
         </p:spPr>
         <p:txBody>
@@ -1753,7 +1753,7 @@
               <a:pPr>
                 <a:defRPr/>
               </a:pPr>
-              <a:t>7/8/21</a:t>
+              <a:t>7/9/21</a:t>
             </a:fld>
             <a:endParaRPr lang="en-US"/>
           </a:p>
@@ -1957,7 +1957,7 @@
         <p:spPr>
           <a:xfrm>
             <a:off x="629842" y="2505075"/>
-            <a:ext cx="3868340" cy="3684588"/>
+            <a:ext cx="3868340" cy="3036889"/>
           </a:xfrm>
         </p:spPr>
         <p:txBody>
@@ -2150,7 +2150,7 @@
               <a:pPr>
                 <a:defRPr/>
               </a:pPr>
-              <a:t>7/8/21</a:t>
+              <a:t>7/9/21</a:t>
             </a:fld>
             <a:endParaRPr lang="en-US"/>
           </a:p>
@@ -2303,7 +2303,7 @@
               <a:pPr>
                 <a:defRPr/>
               </a:pPr>
-              <a:t>7/8/21</a:t>
+              <a:t>7/9/21</a:t>
             </a:fld>
             <a:endParaRPr lang="en-US"/>
           </a:p>
@@ -2425,7 +2425,7 @@
               <a:pPr>
                 <a:defRPr/>
               </a:pPr>
-              <a:t>7/8/21</a:t>
+              <a:t>7/9/21</a:t>
             </a:fld>
             <a:endParaRPr lang="en-US"/>
           </a:p>
@@ -2653,7 +2653,7 @@
         <p:spPr>
           <a:xfrm>
             <a:off x="629841" y="2057400"/>
-            <a:ext cx="2949178" cy="3811588"/>
+            <a:ext cx="2949178" cy="3488635"/>
           </a:xfrm>
         </p:spPr>
         <p:txBody>
@@ -2732,7 +2732,7 @@
               <a:pPr>
                 <a:defRPr/>
               </a:pPr>
-              <a:t>7/8/21</a:t>
+              <a:t>7/9/21</a:t>
             </a:fld>
             <a:endParaRPr lang="en-US"/>
           </a:p>
@@ -2943,7 +2943,7 @@
         <p:spPr>
           <a:xfrm>
             <a:off x="629841" y="2057400"/>
-            <a:ext cx="2949178" cy="3811588"/>
+            <a:ext cx="2949178" cy="3518452"/>
           </a:xfrm>
         </p:spPr>
         <p:txBody>
@@ -3022,7 +3022,7 @@
               <a:pPr>
                 <a:defRPr/>
               </a:pPr>
-              <a:t>7/8/21</a:t>
+              <a:t>7/9/21</a:t>
             </a:fld>
             <a:endParaRPr lang="en-US"/>
           </a:p>
@@ -3135,7 +3135,7 @@
         <p:spPr bwMode="auto">
           <a:xfrm>
             <a:off x="628650" y="1825625"/>
-            <a:ext cx="7886700" cy="4351338"/>
+            <a:ext cx="7886700" cy="3776663"/>
           </a:xfrm>
           <a:prstGeom prst="rect">
             <a:avLst/>
@@ -3163,7 +3163,7 @@
               </a14:hiddenLine>
             </a:ext>
             <a:ext uri="{FAA26D3D-D897-4be2-8F04-BA451C77F1D7}">
-              <ma14:placeholderFlag xmlns:ma14="http://schemas.microsoft.com/office/mac/drawingml/2011/main" xmlns="" val="1"/>
+              <ma14:placeholderFlag xmlns="" xmlns:ma14="http://schemas.microsoft.com/office/mac/drawingml/2011/main" val="1"/>
             </a:ext>
           </a:extLst>
         </p:spPr>
@@ -3259,7 +3259,7 @@
               <a:pPr>
                 <a:defRPr/>
               </a:pPr>
-              <a:t>7/8/21</a:t>
+              <a:t>7/9/21</a:t>
             </a:fld>
             <a:endParaRPr lang="en-US"/>
           </a:p>
@@ -3460,7 +3460,7 @@
               </a14:hiddenLine>
             </a:ext>
             <a:ext uri="{FAA26D3D-D897-4be2-8F04-BA451C77F1D7}">
-              <ma14:placeholderFlag xmlns:ma14="http://schemas.microsoft.com/office/mac/drawingml/2011/main" xmlns="" val="1"/>
+              <ma14:placeholderFlag xmlns="" xmlns:ma14="http://schemas.microsoft.com/office/mac/drawingml/2011/main" val="1"/>
             </a:ext>
           </a:extLst>
         </p:spPr>

</xml_diff>